<commit_message>
preserve hymn markdown line breaks
</commit_message>
<xml_diff>
--- a/processed/mvccc/157_記念主名.pptx
+++ b/processed/mvccc/157_記念主名.pptx
@@ -773,7 +773,7 @@
 </file>
 
 <file path=ppt/slideLayouts/slideLayout3.xml><?xml version="1.0" encoding="utf-8"?>
-<p:sldLayout xmlns:a="http://schemas.openxmlformats.org/drawingml/2006/main" xmlns:r="http://schemas.openxmlformats.org/officeDocument/2006/relationships" xmlns:p="http://schemas.openxmlformats.org/presentationml/2006/main" xmlns:m="http://schemas.openxmlformats.org/officeDocument/2006/math" xmlns:a14="http://schemas.microsoft.com/office/drawing/2010/main" type="tx" showMasterSp="1" showMasterPhAnim="1">
+<p:sldLayout xmlns:a="http://schemas.openxmlformats.org/drawingml/2006/main" xmlns:p="http://schemas.openxmlformats.org/presentationml/2006/main" type="tx" showMasterSp="1" showMasterPhAnim="1">
   <p:cSld name="verse">
     <p:spTree>
       <p:nvGrpSpPr>
@@ -804,7 +804,16 @@
         </p:spPr>
         <p:txBody>
           <a:bodyPr/>
-          <a:lstStyle/>
+          <a:lstStyle>
+            <a:lvl1pPr>
+              <a:defRPr sz="5200" b="1">
+                <a:latin typeface="Helvetica Neue"/>
+                <a:ea typeface="Helvetica Neue"/>
+                <a:cs typeface="Helvetica Neue"/>
+                <a:sym typeface="Helvetica Neue"/>
+              </a:defRPr>
+            </a:lvl1pPr>
+          </a:lstStyle>
           <a:p>
             <a:pPr/>
             <a:r>
@@ -828,7 +837,19 @@
         </p:spPr>
         <p:txBody>
           <a:bodyPr/>
-          <a:lstStyle/>
+          <a:lstStyle>
+            <a:lvl1pPr>
+              <a:defRPr sz="3800">
+                <a:latin typeface="Helvetica Neue"/>
+                <a:ea typeface="Helvetica Neue"/>
+                <a:cs typeface="Helvetica Neue"/>
+                <a:sym typeface="Helvetica Neue"/>
+              </a:defRPr>
+              <a:lnSpc>
+                <a:spcPct val="120000"/>
+              </a:lnSpc>
+            </a:lvl1pPr>
+          </a:lstStyle>
           <a:p>
             <a:pPr/>
             <a:r>
@@ -864,12 +885,12 @@
   <p:clrMapOvr>
     <a:masterClrMapping/>
   </p:clrMapOvr>
-  <p:transition xmlns:p14="http://schemas.microsoft.com/office/powerpoint/2010/main" spd="med" advClick="1"/>
+  <p:transition spd="med" advClick="1"/>
 </p:sldLayout>
 </file>
 
 <file path=ppt/slideLayouts/slideLayout4.xml><?xml version="1.0" encoding="utf-8"?>
-<p:sldLayout xmlns:a="http://schemas.openxmlformats.org/drawingml/2006/main" xmlns:r="http://schemas.openxmlformats.org/officeDocument/2006/relationships" xmlns:p="http://schemas.openxmlformats.org/presentationml/2006/main" xmlns:m="http://schemas.openxmlformats.org/officeDocument/2006/math" xmlns:a14="http://schemas.microsoft.com/office/drawing/2010/main" type="tx" showMasterSp="1" showMasterPhAnim="1">
+<p:sldLayout xmlns:a="http://schemas.openxmlformats.org/drawingml/2006/main" xmlns:p="http://schemas.openxmlformats.org/presentationml/2006/main" type="tx" showMasterSp="1" showMasterPhAnim="1">
   <p:cSld name="memorize">
     <p:spTree>
       <p:nvGrpSpPr>
@@ -902,7 +923,7 @@
           <a:bodyPr/>
           <a:lstStyle>
             <a:lvl1pPr>
-              <a:defRPr b="1" sz="6000">
+              <a:defRPr b="1" sz="7200">
                 <a:latin typeface="Helvetica Neue"/>
                 <a:ea typeface="Helvetica Neue"/>
                 <a:cs typeface="Helvetica Neue"/>
@@ -933,7 +954,19 @@
         </p:spPr>
         <p:txBody>
           <a:bodyPr/>
-          <a:lstStyle/>
+          <a:lstStyle>
+            <a:lvl1pPr>
+              <a:defRPr sz="3800">
+                <a:latin typeface="Helvetica Neue"/>
+                <a:ea typeface="Helvetica Neue"/>
+                <a:cs typeface="Helvetica Neue"/>
+                <a:sym typeface="Helvetica Neue"/>
+              </a:defRPr>
+              <a:lnSpc>
+                <a:spcPct val="120000"/>
+              </a:lnSpc>
+            </a:lvl1pPr>
+          </a:lstStyle>
           <a:p>
             <a:pPr/>
             <a:r>
@@ -969,12 +1002,12 @@
   <p:clrMapOvr>
     <a:masterClrMapping/>
   </p:clrMapOvr>
-  <p:transition xmlns:p14="http://schemas.microsoft.com/office/powerpoint/2010/main" spd="med" advClick="1"/>
+  <p:transition spd="med" advClick="1"/>
 </p:sldLayout>
 </file>
 
 <file path=ppt/slideLayouts/slideLayout5.xml><?xml version="1.0" encoding="utf-8"?>
-<p:sldLayout xmlns:a="http://schemas.openxmlformats.org/drawingml/2006/main" xmlns:r="http://schemas.openxmlformats.org/officeDocument/2006/relationships" xmlns:p="http://schemas.openxmlformats.org/presentationml/2006/main" xmlns:m="http://schemas.openxmlformats.org/officeDocument/2006/math" xmlns:a14="http://schemas.microsoft.com/office/drawing/2010/main" type="tx" showMasterSp="1" showMasterPhAnim="1">
+<p:sldLayout xmlns:a="http://schemas.openxmlformats.org/drawingml/2006/main" xmlns:p="http://schemas.openxmlformats.org/presentationml/2006/main" type="tx" showMasterSp="1" showMasterPhAnim="1">
   <p:cSld name="teaching">
     <p:spTree>
       <p:nvGrpSpPr>
@@ -1007,7 +1040,7 @@
           <a:bodyPr/>
           <a:lstStyle>
             <a:lvl1pPr>
-              <a:defRPr b="1" sz="6000">
+              <a:defRPr b="1" sz="5600">
                 <a:latin typeface="Helvetica Neue"/>
                 <a:ea typeface="Helvetica Neue"/>
                 <a:cs typeface="Helvetica Neue"/>
@@ -1039,7 +1072,17 @@
         <p:txBody>
           <a:bodyPr/>
           <a:lstStyle>
-            <a:lvl1pPr algn="ctr"/>
+            <a:lvl1pPr algn="ctr">
+              <a:defRPr sz="3600">
+                <a:latin typeface="Helvetica Neue"/>
+                <a:ea typeface="Helvetica Neue"/>
+                <a:cs typeface="Helvetica Neue"/>
+                <a:sym typeface="Helvetica Neue"/>
+              </a:defRPr>
+              <a:lnSpc>
+                <a:spcPct val="120000"/>
+              </a:lnSpc>
+            </a:lvl1pPr>
           </a:lstStyle>
           <a:p>
             <a:pPr/>
@@ -1076,12 +1119,12 @@
   <p:clrMapOvr>
     <a:masterClrMapping/>
   </p:clrMapOvr>
-  <p:transition xmlns:p14="http://schemas.microsoft.com/office/powerpoint/2010/main" spd="med" advClick="1"/>
+  <p:transition spd="med" advClick="1"/>
 </p:sldLayout>
 </file>
 
 <file path=ppt/slideLayouts/slideLayout6.xml><?xml version="1.0" encoding="utf-8"?>
-<p:sldLayout xmlns:a="http://schemas.openxmlformats.org/drawingml/2006/main" xmlns:r="http://schemas.openxmlformats.org/officeDocument/2006/relationships" xmlns:p="http://schemas.openxmlformats.org/presentationml/2006/main" xmlns:m="http://schemas.openxmlformats.org/officeDocument/2006/math" xmlns:a14="http://schemas.microsoft.com/office/drawing/2010/main" type="tx" showMasterSp="1" showMasterPhAnim="1">
+<p:sldLayout xmlns:a="http://schemas.openxmlformats.org/drawingml/2006/main" xmlns:p="http://schemas.openxmlformats.org/presentationml/2006/main" type="tx" showMasterSp="1" showMasterPhAnim="1">
   <p:cSld name="section">
     <p:spTree>
       <p:nvGrpSpPr>
@@ -1118,7 +1161,7 @@
           <a:bodyPr/>
           <a:lstStyle>
             <a:lvl1pPr>
-              <a:defRPr b="1">
+              <a:defRPr b="1" sz="7200">
                 <a:latin typeface="Helvetica Neue"/>
                 <a:ea typeface="Helvetica Neue"/>
                 <a:cs typeface="Helvetica Neue"/>
@@ -1161,7 +1204,7 @@
   <p:clrMapOvr>
     <a:masterClrMapping/>
   </p:clrMapOvr>
-  <p:transition xmlns:p14="http://schemas.microsoft.com/office/powerpoint/2010/main" spd="med" advClick="1"/>
+  <p:transition spd="med" advClick="1"/>
 </p:sldLayout>
 </file>
 
@@ -1342,7 +1385,7 @@
 </file>
 
 <file path=ppt/slideMasters/slideMaster1.xml><?xml version="1.0" encoding="utf-8"?>
-<p:sldMaster xmlns:a="http://schemas.openxmlformats.org/drawingml/2006/main" xmlns:r="http://schemas.openxmlformats.org/officeDocument/2006/relationships" xmlns:p="http://schemas.openxmlformats.org/presentationml/2006/main" xmlns:m="http://schemas.openxmlformats.org/officeDocument/2006/math" xmlns:a14="http://schemas.microsoft.com/office/drawing/2010/main">
+<p:sldMaster xmlns:a="http://schemas.openxmlformats.org/drawingml/2006/main" xmlns:ns3="http://schemas.microsoft.com/office/mac/drawingml/2011/main" xmlns:p="http://schemas.openxmlformats.org/presentationml/2006/main" xmlns:r="http://schemas.openxmlformats.org/officeDocument/2006/relationships">
   <p:cSld>
     <p:bg>
       <p:bgPr>
@@ -3192,7 +3235,7 @@
           </a:ln>
           <a:extLst>
             <a:ext uri="{C572A759-6A51-4108-AA02-DFA0A04FC94B}">
-              <ma14:wrappingTextBoxFlag xmlns:ma14="http://schemas.microsoft.com/office/mac/drawingml/2011/main" val="1"/>
+              <ns3:wrappingTextBoxFlag val="1"/>
             </a:ext>
           </a:extLst>
         </p:spPr>
@@ -3230,7 +3273,7 @@
           </a:ln>
           <a:extLst>
             <a:ext uri="{C572A759-6A51-4108-AA02-DFA0A04FC94B}">
-              <ma14:wrappingTextBoxFlag xmlns:ma14="http://schemas.microsoft.com/office/mac/drawingml/2011/main" val="1"/>
+              <ns3:wrappingTextBoxFlag val="1"/>
             </a:ext>
           </a:extLst>
         </p:spPr>
@@ -3329,7 +3372,7 @@
     <p:sldLayoutId id="2147483657" r:id="rId11"/>
     <p:sldLayoutId id="2147483658" r:id="rId12"/>
   </p:sldLayoutIdLst>
-  <p:transition xmlns:p14="http://schemas.microsoft.com/office/powerpoint/2010/main" spd="med" advClick="1"/>
+  <p:transition spd="med" advClick="1"/>
   <p:txStyles>
     <p:titleStyle>
       <a:lvl1pPr marL="0" marR="0" indent="0" algn="ctr" defTabSz="914400" rtl="0" latinLnBrk="0">
@@ -3347,7 +3390,7 @@
         <a:buFontTx/>
         <a:buNone/>
         <a:tabLst/>
-        <a:defRPr b="0" baseline="0" cap="none" i="0" spc="0" strike="noStrike" sz="5400" u="none">
+        <a:defRPr b="0" baseline="0" cap="none" i="0" spc="0" strike="noStrike" sz="6400" u="none">
           <a:solidFill>
             <a:schemeClr val="accent6"/>
           </a:solidFill>
@@ -3357,10 +3400,10 @@
             </a:outerShdw>
           </a:effectLst>
           <a:uFillTx/>
-          <a:latin typeface="PingFang TC Semibold"/>
-          <a:ea typeface="PingFang TC Semibold"/>
-          <a:cs typeface="PingFang TC Semibold"/>
-          <a:sym typeface="PingFang TC Semibold"/>
+          <a:latin typeface="Helvetica Neue"/>
+          <a:ea typeface="Helvetica Neue"/>
+          <a:cs typeface="Helvetica Neue"/>
+          <a:sym typeface="Helvetica Neue"/>
         </a:defRPr>
       </a:lvl1pPr>
       <a:lvl2pPr marL="0" marR="0" indent="0" algn="ctr" defTabSz="914400" rtl="0" latinLnBrk="0">
@@ -3628,7 +3671,7 @@
         <a:buFontTx/>
         <a:buNone/>
         <a:tabLst/>
-        <a:defRPr b="0" baseline="0" cap="none" i="0" spc="0" strike="noStrike" sz="4800" u="none">
+        <a:defRPr b="0" baseline="0" cap="none" i="0" spc="0" strike="noStrike" sz="4000" u="none">
           <a:solidFill>
             <a:schemeClr val="accent6"/>
           </a:solidFill>
@@ -4198,12 +4241,22 @@
           <a:lstStyle/>
           <a:p>
             <a:r>
-              <a:t> 憂苦弟兄容我勸你，常常記念耶穌名；</a:t>
+              <a:t> 憂苦弟兄容我勸你，</a:t>
             </a:r>
           </a:p>
           <a:p>
             <a:r>
-              <a:t>這名使你煩悶變喜，疑懼消散心安平。</a:t>
+              <a:t>常常記念耶穌名；</a:t>
+            </a:r>
+          </a:p>
+          <a:p>
+            <a:r>
+              <a:t>這名使你煩悶變喜，</a:t>
+            </a:r>
+          </a:p>
+          <a:p>
+            <a:r>
+              <a:t>疑懼消散心安平。</a:t>
             </a:r>
           </a:p>
         </p:txBody>
@@ -4242,12 +4295,22 @@
           <a:lstStyle/>
           <a:p>
             <a:r>
-              <a:t> 處處記念耶穌聖名，當作盾牌敵魔劍；</a:t>
+              <a:t> 處處記念耶穌聖名，</a:t>
             </a:r>
           </a:p>
           <a:p>
             <a:r>
-              <a:t>眾惑環繞齊來攻逼，靠主聖名就得勝。</a:t>
+              <a:t>當作盾牌敵魔劍；</a:t>
+            </a:r>
+          </a:p>
+          <a:p>
+            <a:r>
+              <a:t>眾惑環繞齊來攻逼，</a:t>
+            </a:r>
+          </a:p>
+          <a:p>
+            <a:r>
+              <a:t>靠主聖名就得勝。</a:t>
             </a:r>
           </a:p>
         </p:txBody>
@@ -4286,12 +4349,22 @@
           <a:lstStyle/>
           <a:p>
             <a:r>
-              <a:t> 耶穌名字馨香寶貴，我一聽聞就歡欣；</a:t>
+              <a:t> 耶穌名字馨香寶貴，</a:t>
             </a:r>
           </a:p>
           <a:p>
             <a:r>
-              <a:t>但願人人得其安慰，同我稱頌主聖名。</a:t>
+              <a:t>我一聽聞就歡欣；</a:t>
+            </a:r>
+          </a:p>
+          <a:p>
+            <a:r>
+              <a:t>但願人人得其安慰，</a:t>
+            </a:r>
+          </a:p>
+          <a:p>
+            <a:r>
+              <a:t>同我稱頌主聖名。</a:t>
             </a:r>
           </a:p>
         </p:txBody>
@@ -4330,12 +4403,22 @@
           <a:lstStyle/>
           <a:p>
             <a:r>
-              <a:t> 經歷世途艱辛疲累，聽見主名心歡暢；</a:t>
+              <a:t> 經歷世途艱辛疲累，</a:t>
             </a:r>
           </a:p>
           <a:p>
             <a:r>
-              <a:t>摘下冠冕主前伏拜，歡稱耶穌是我王。</a:t>
+              <a:t>聽見主名心歡暢；</a:t>
+            </a:r>
+          </a:p>
+          <a:p>
+            <a:r>
+              <a:t>摘下冠冕主前伏拜，</a:t>
+            </a:r>
+          </a:p>
+          <a:p>
+            <a:r>
+              <a:t>歡稱耶穌是我王。</a:t>
             </a:r>
           </a:p>
         </p:txBody>
@@ -4379,7 +4462,12 @@
           </a:p>
           <a:p>
             <a:r>
-              <a:t>地之望而天之樂，名至寶，名最甜！</a:t>
+              <a:t>地之望而天之樂;</a:t>
+            </a:r>
+          </a:p>
+          <a:p>
+            <a:r>
+              <a:t>名至寶，名最甜！</a:t>
             </a:r>
           </a:p>
           <a:p>

</xml_diff>